<commit_message>
Update master slides for MR example
</commit_message>
<xml_diff>
--- a/slides/ShanghaiDataScience_Master.pptx
+++ b/slides/ShanghaiDataScience_Master.pptx
@@ -4835,11 +4835,7 @@
             </a:r>
             <a:r>
               <a:rPr lang="en-US" sz="2400" dirty="0" smtClean="0"/>
-              <a:t>hdfs</a:t>
-            </a:r>
-            <a:r>
-              <a:rPr lang="en-US" sz="2400" dirty="0" smtClean="0"/>
-              <a:t>://localhost:9000/flume</a:t>
+              <a:t>hdfs://localhost:9000/flume</a:t>
             </a:r>
             <a:endParaRPr lang="en-US" sz="2400" dirty="0"/>
           </a:p>
@@ -5821,11 +5817,7 @@
             </a:r>
             <a:r>
               <a:rPr lang="en-US" dirty="0" smtClean="0"/>
-              <a:t>“||</a:t>
-            </a:r>
-            <a:r>
-              <a:rPr lang="en-US" dirty="0" smtClean="0"/>
-              <a:t>flume-ng </a:t>
+              <a:t>“||flume-ng </a:t>
             </a:r>
             <a:r>
               <a:rPr lang="en-US" dirty="0" err="1"/>
@@ -8291,11 +8283,7 @@
             </a:pPr>
             <a:r>
               <a:rPr lang="en-US" dirty="0" smtClean="0"/>
-              <a:t>What is </a:t>
-            </a:r>
-            <a:r>
-              <a:rPr lang="en-US" dirty="0" smtClean="0"/>
-              <a:t>map/reduce?</a:t>
+              <a:t>What is map/reduce?</a:t>
             </a:r>
           </a:p>
           <a:p>
@@ -12493,7 +12481,7 @@
         <p:spPr/>
         <p:txBody>
           <a:bodyPr>
-            <a:normAutofit fontScale="85000" lnSpcReduction="20000"/>
+            <a:normAutofit fontScale="92500" lnSpcReduction="20000"/>
           </a:bodyPr>
           <a:lstStyle/>
           <a:p>
@@ -12514,7 +12502,15 @@
             </a:r>
             <a:r>
               <a:rPr lang="en-US" dirty="0"/>
-              <a:t>, Text, </a:t>
+              <a:t>, </a:t>
+            </a:r>
+            <a:r>
+              <a:rPr lang="en-US" dirty="0" err="1"/>
+              <a:t>BytesWritable</a:t>
+            </a:r>
+            <a:r>
+              <a:rPr lang="en-US" dirty="0"/>
+              <a:t>, </a:t>
             </a:r>
             <a:r>
               <a:rPr lang="en-US" b="1" dirty="0">
@@ -12579,7 +12575,19 @@
             </a:r>
             <a:r>
               <a:rPr lang="en-US" dirty="0"/>
-              <a:t> key, Text value, Context context) </a:t>
+              <a:t> key, </a:t>
+            </a:r>
+            <a:r>
+              <a:rPr lang="en-US" dirty="0" err="1" smtClean="0"/>
+              <a:t>BytesWritable</a:t>
+            </a:r>
+            <a:r>
+              <a:rPr lang="en-US" dirty="0" smtClean="0"/>
+              <a:t> value</a:t>
+            </a:r>
+            <a:r>
+              <a:rPr lang="en-US" dirty="0"/>
+              <a:t>, Context context) </a:t>
             </a:r>
             <a:r>
               <a:rPr lang="en-US" dirty="0" smtClean="0"/>
@@ -12593,65 +12601,32 @@
             </a:pPr>
             <a:r>
               <a:rPr lang="en-US" dirty="0" smtClean="0"/>
-              <a:t>          </a:t>
-            </a:r>
-            <a:r>
-              <a:rPr lang="en-US" dirty="0" err="1" smtClean="0"/>
-              <a:t>StringTokenizer</a:t>
-            </a:r>
-            <a:r>
-              <a:rPr lang="en-US" dirty="0" smtClean="0"/>
-              <a:t> </a:t>
+              <a:t>          String </a:t>
             </a:r>
             <a:r>
               <a:rPr lang="en-US" dirty="0"/>
-              <a:t>tokenizer = new </a:t>
-            </a:r>
-            <a:r>
-              <a:rPr lang="en-US" dirty="0" err="1" smtClean="0"/>
-              <a:t>StringTokenizer</a:t>
-            </a:r>
-            <a:r>
-              <a:rPr lang="en-US" dirty="0" smtClean="0"/>
-              <a:t>(</a:t>
+              <a:t>line = new String(</a:t>
             </a:r>
             <a:r>
               <a:rPr lang="en-US" dirty="0" err="1"/>
-              <a:t>value.toString</a:t>
-            </a:r>
-            <a:r>
-              <a:rPr lang="en-US" dirty="0" smtClean="0"/>
+              <a:t>value.getBytes</a:t>
+            </a:r>
+            <a:r>
+              <a:rPr lang="en-US" dirty="0"/>
               <a:t>());</a:t>
             </a:r>
-            <a:endParaRPr lang="en-US" dirty="0"/>
           </a:p>
           <a:p>
             <a:pPr marL="0" indent="0">
               <a:buNone/>
             </a:pPr>
             <a:r>
+              <a:rPr lang="en-US" dirty="0" smtClean="0"/>
+              <a:t>          Text </a:t>
+            </a:r>
+            <a:r>
               <a:rPr lang="en-US" dirty="0"/>
-              <a:t>        </a:t>
-            </a:r>
-            <a:r>
-              <a:rPr lang="en-US" dirty="0" smtClean="0"/>
-              <a:t>  while </a:t>
-            </a:r>
-            <a:r>
-              <a:rPr lang="en-US" dirty="0"/>
-              <a:t>(</a:t>
-            </a:r>
-            <a:r>
-              <a:rPr lang="en-US" dirty="0" err="1"/>
-              <a:t>tokenizer.hasMoreTokens</a:t>
-            </a:r>
-            <a:r>
-              <a:rPr lang="en-US" dirty="0"/>
-              <a:t>()) </a:t>
-            </a:r>
-            <a:r>
-              <a:rPr lang="en-US" dirty="0" smtClean="0"/>
-              <a:t>{</a:t>
+              <a:t>word = new Text();</a:t>
             </a:r>
           </a:p>
           <a:p>
@@ -12660,66 +12635,57 @@
             </a:pPr>
             <a:r>
               <a:rPr lang="en-US" dirty="0" smtClean="0"/>
-              <a:t>              Text </a:t>
+              <a:t>          </a:t>
+            </a:r>
+            <a:r>
+              <a:rPr lang="en-US" dirty="0" err="1" smtClean="0"/>
+              <a:t>word.set</a:t>
+            </a:r>
+            <a:r>
+              <a:rPr lang="en-US" dirty="0" smtClean="0"/>
+              <a:t>(</a:t>
+            </a:r>
+            <a:r>
+              <a:rPr lang="en-US" dirty="0" err="1" smtClean="0"/>
+              <a:t>line.split</a:t>
             </a:r>
             <a:r>
               <a:rPr lang="en-US" dirty="0"/>
-              <a:t>word = new Text</a:t>
-            </a:r>
-            <a:r>
-              <a:rPr lang="en-US" dirty="0" smtClean="0"/>
-              <a:t>();</a:t>
-            </a:r>
-            <a:endParaRPr lang="en-US" dirty="0"/>
+              <a:t>(" ")[6]);</a:t>
+            </a:r>
           </a:p>
           <a:p>
             <a:pPr marL="0" indent="0">
               <a:buNone/>
             </a:pPr>
             <a:r>
-              <a:rPr lang="en-US" dirty="0"/>
+              <a:rPr lang="en-US" dirty="0" smtClean="0"/>
               <a:t>          </a:t>
             </a:r>
             <a:r>
-              <a:rPr lang="en-US" dirty="0" smtClean="0"/>
-              <a:t>    </a:t>
-            </a:r>
-            <a:r>
-              <a:rPr lang="en-US" dirty="0" err="1"/>
-              <a:t>word.set</a:t>
-            </a:r>
-            <a:r>
-              <a:rPr lang="en-US" dirty="0"/>
+              <a:rPr lang="en-US" dirty="0" err="1" smtClean="0"/>
+              <a:t>context.write</a:t>
+            </a:r>
+            <a:r>
+              <a:rPr lang="en-US" dirty="0" smtClean="0"/>
               <a:t>(</a:t>
             </a:r>
             <a:r>
-              <a:rPr lang="en-US" dirty="0" err="1"/>
-              <a:t>tokenizer.nextToken</a:t>
-            </a:r>
-            <a:r>
-              <a:rPr lang="en-US" dirty="0"/>
-              <a:t>());</a:t>
-            </a:r>
-          </a:p>
-          <a:p>
-            <a:pPr marL="0" indent="0">
-              <a:buNone/>
-            </a:pPr>
-            <a:r>
-              <a:rPr lang="en-US" dirty="0"/>
-              <a:t>        </a:t>
-            </a:r>
-            <a:r>
-              <a:rPr lang="en-US" dirty="0" smtClean="0"/>
-              <a:t>      </a:t>
-            </a:r>
-            <a:r>
-              <a:rPr lang="en-US" dirty="0" err="1"/>
-              <a:t>context.write</a:t>
-            </a:r>
-            <a:r>
-              <a:rPr lang="en-US" dirty="0"/>
-              <a:t>(</a:t>
+              <a:rPr lang="en-US" sz="3800" b="1" dirty="0" smtClean="0">
+                <a:ln w="22225">
+                  <a:solidFill>
+                    <a:schemeClr val="accent2"/>
+                  </a:solidFill>
+                  <a:prstDash val="solid"/>
+                </a:ln>
+                <a:solidFill>
+                  <a:schemeClr val="accent2">
+                    <a:lumMod val="40000"/>
+                    <a:lumOff val="60000"/>
+                  </a:schemeClr>
+                </a:solidFill>
+              </a:rPr>
+              <a:t>word</a:t>
             </a:r>
             <a:r>
               <a:rPr lang="en-US" sz="3800" b="1" dirty="0">
@@ -12736,7 +12702,7 @@
                   </a:schemeClr>
                 </a:solidFill>
               </a:rPr>
-              <a:t>word, </a:t>
+              <a:t>, </a:t>
             </a:r>
             <a:r>
               <a:rPr lang="en-US" sz="3800" b="1" dirty="0" smtClean="0">
@@ -12794,23 +12760,6 @@
               <a:t>);</a:t>
             </a:r>
             <a:endParaRPr lang="en-US" dirty="0"/>
-          </a:p>
-          <a:p>
-            <a:pPr marL="0" indent="0">
-              <a:buNone/>
-            </a:pPr>
-            <a:r>
-              <a:rPr lang="en-US" dirty="0"/>
-              <a:t>      </a:t>
-            </a:r>
-            <a:r>
-              <a:rPr lang="en-US" dirty="0" smtClean="0"/>
-              <a:t>    </a:t>
-            </a:r>
-            <a:r>
-              <a:rPr lang="en-US" dirty="0"/>
-              <a:t>}</a:t>
-            </a:r>
           </a:p>
           <a:p>
             <a:pPr marL="0" indent="0">
@@ -13512,7 +13461,7 @@
         <p:spPr/>
         <p:txBody>
           <a:bodyPr numCol="2" spcCol="180000">
-            <a:normAutofit fontScale="70000" lnSpcReduction="20000"/>
+            <a:normAutofit fontScale="62500" lnSpcReduction="20000"/>
           </a:bodyPr>
           <a:lstStyle/>
           <a:p>
@@ -13762,16 +13711,24 @@
               <a:buNone/>
             </a:pPr>
             <a:r>
-              <a:rPr lang="en-US" dirty="0" err="1" smtClean="0"/>
+              <a:rPr lang="en-US" dirty="0" err="1"/>
               <a:t>job.setInputFormatClass</a:t>
             </a:r>
             <a:r>
-              <a:rPr lang="en-US" dirty="0" smtClean="0"/>
+              <a:rPr lang="en-US" dirty="0"/>
               <a:t>(</a:t>
             </a:r>
             <a:r>
-              <a:rPr lang="en-US" dirty="0" err="1" smtClean="0"/>
-              <a:t>TextInputFormat.class</a:t>
+              <a:rPr lang="en-US" dirty="0" err="1">
+                <a:solidFill>
+                  <a:srgbClr val="FF0000"/>
+                </a:solidFill>
+              </a:rPr>
+              <a:t>SequenceFileInputFormat</a:t>
+            </a:r>
+            <a:r>
+              <a:rPr lang="en-US" dirty="0" err="1"/>
+              <a:t>.class</a:t>
             </a:r>
             <a:r>
               <a:rPr lang="en-US" dirty="0" smtClean="0"/>
@@ -14037,11 +13994,7 @@
           <a:p>
             <a:r>
               <a:rPr lang="en-US" dirty="0" smtClean="0"/>
-              <a:t>Start </a:t>
-            </a:r>
-            <a:r>
-              <a:rPr lang="en-US" dirty="0" smtClean="0"/>
-              <a:t>Hadoop</a:t>
+              <a:t>Start Hadoop</a:t>
             </a:r>
           </a:p>
           <a:p>
@@ -14135,10 +14088,22 @@
           <a:lstStyle/>
           <a:p>
             <a:r>
-              <a:rPr lang="en-US" smtClean="0"/>
-              <a:t>Karthik Rajasethupathy, Christian Kuka</a:t>
-            </a:r>
-            <a:endParaRPr lang="en-US"/>
+              <a:rPr lang="en-US" dirty="0" err="1" smtClean="0"/>
+              <a:t>Karthik</a:t>
+            </a:r>
+            <a:r>
+              <a:rPr lang="en-US" dirty="0" smtClean="0"/>
+              <a:t> </a:t>
+            </a:r>
+            <a:r>
+              <a:rPr lang="en-US" dirty="0" err="1" smtClean="0"/>
+              <a:t>Rajasethupathy</a:t>
+            </a:r>
+            <a:r>
+              <a:rPr lang="en-US" dirty="0" smtClean="0"/>
+              <a:t>, Christian Kuka</a:t>
+            </a:r>
+            <a:endParaRPr lang="en-US" dirty="0"/>
           </a:p>
         </p:txBody>
       </p:sp>
@@ -28460,19 +28425,7 @@
               <a:rPr lang="en-US" dirty="0" smtClean="0">
                 <a:sym typeface="Wingdings" panose="05000000000000000000" pitchFamily="2" charset="2"/>
               </a:rPr>
-              <a:t> http://</a:t>
-            </a:r>
-            <a:r>
-              <a:rPr lang="en-US" dirty="0" smtClean="0">
-                <a:sym typeface="Wingdings" panose="05000000000000000000" pitchFamily="2" charset="2"/>
-              </a:rPr>
-              <a:t>hadoop.apache.org</a:t>
-            </a:r>
-            <a:r>
-              <a:rPr lang="en-US" dirty="0" smtClean="0">
-                <a:sym typeface="Wingdings" panose="05000000000000000000" pitchFamily="2" charset="2"/>
-              </a:rPr>
-              <a:t>/</a:t>
+              <a:t> http://hadoop.apache.org/</a:t>
             </a:r>
             <a:endParaRPr lang="en-US" dirty="0"/>
           </a:p>

</xml_diff>